<commit_message>
Update sim lesson 4 and 5 notes
</commit_message>
<xml_diff>
--- a/3D graphics/SIM/lesson 4/Workshop 4a Basic Matrix and 2D Transformation.pptx
+++ b/3D graphics/SIM/lesson 4/Workshop 4a Basic Matrix and 2D Transformation.pptx
@@ -33,6 +33,10 @@
     <p:sldId id="345" r:id="rId27"/>
     <p:sldId id="346" r:id="rId28"/>
     <p:sldId id="347" r:id="rId29"/>
+    <p:sldId id="348" r:id="rId30"/>
+    <p:sldId id="349" r:id="rId31"/>
+    <p:sldId id="350" r:id="rId32"/>
+    <p:sldId id="351" r:id="rId33"/>
   </p:sldIdLst>
   <p:sldSz cx="9144000" cy="6858000" type="screen4x3"/>
   <p:notesSz cx="6858000" cy="9144000"/>
@@ -367,7 +371,7 @@
           <a:p>
             <a:fld id="{9AB3A824-1A51-4B26-AD58-A6D8E14F6C04}" type="datetimeFigureOut">
               <a:rPr lang="en-US" smtClean="0"/>
-              <a:t>11/8/21</a:t>
+              <a:t>11/7/2022</a:t>
             </a:fld>
             <a:endParaRPr lang="en-US" dirty="0"/>
           </a:p>
@@ -709,7 +713,7 @@
             <a:fld id="{8E36636D-D922-432D-A958-524484B5923D}" type="datetimeFigureOut">
               <a:rPr lang="en-US" smtClean="0"/>
               <a:pPr/>
-              <a:t>11/8/21</a:t>
+              <a:t>11/7/2022</a:t>
             </a:fld>
             <a:endParaRPr lang="en-US"/>
           </a:p>
@@ -1013,7 +1017,7 @@
           <a:p>
             <a:fld id="{D3FFE419-2371-464F-8239-3959401C3561}" type="datetimeFigureOut">
               <a:rPr lang="en-US" smtClean="0"/>
-              <a:t>11/8/21</a:t>
+              <a:t>11/7/2022</a:t>
             </a:fld>
             <a:endParaRPr lang="en-US" dirty="0"/>
           </a:p>
@@ -1263,7 +1267,7 @@
             <a:fld id="{8E36636D-D922-432D-A958-524484B5923D}" type="datetimeFigureOut">
               <a:rPr lang="en-US" smtClean="0"/>
               <a:pPr/>
-              <a:t>11/8/21</a:t>
+              <a:t>11/7/2022</a:t>
             </a:fld>
             <a:endParaRPr lang="en-US"/>
           </a:p>
@@ -1631,7 +1635,7 @@
           <a:p>
             <a:fld id="{3E5059C3-6A89-4494-99FF-5A4D6FFD50EB}" type="datetimeFigureOut">
               <a:rPr lang="en-US" smtClean="0"/>
-              <a:t>11/8/21</a:t>
+              <a:t>11/7/2022</a:t>
             </a:fld>
             <a:endParaRPr lang="en-US" dirty="0"/>
           </a:p>
@@ -1950,7 +1954,7 @@
           <a:p>
             <a:fld id="{CA954B2F-12DE-47F5-8894-472B206D2E1E}" type="datetimeFigureOut">
               <a:rPr lang="en-US" smtClean="0"/>
-              <a:t>11/8/21</a:t>
+              <a:t>11/7/2022</a:t>
             </a:fld>
             <a:endParaRPr lang="en-US" dirty="0"/>
           </a:p>
@@ -2534,7 +2538,7 @@
           <a:p>
             <a:fld id="{3F30E46F-7819-4ACF-B48B-48222C2ACC88}" type="datetimeFigureOut">
               <a:rPr lang="en-US" smtClean="0"/>
-              <a:t>11/8/21</a:t>
+              <a:t>11/7/2022</a:t>
             </a:fld>
             <a:endParaRPr lang="en-US" dirty="0"/>
           </a:p>
@@ -2772,7 +2776,7 @@
           <a:p>
             <a:fld id="{1FAF3416-4057-4DAA-829D-4CA07428D088}" type="datetimeFigureOut">
               <a:rPr lang="en-US" smtClean="0"/>
-              <a:t>11/8/21</a:t>
+              <a:t>11/7/2022</a:t>
             </a:fld>
             <a:endParaRPr lang="en-US" dirty="0"/>
           </a:p>
@@ -2946,7 +2950,7 @@
           <a:p>
             <a:fld id="{921D9284-D300-4297-87F7-E791DCC15DB1}" type="datetimeFigureOut">
               <a:rPr lang="en-US" smtClean="0"/>
-              <a:t>11/8/21</a:t>
+              <a:t>11/7/2022</a:t>
             </a:fld>
             <a:endParaRPr lang="en-US" dirty="0"/>
           </a:p>
@@ -3319,7 +3323,7 @@
           <a:p>
             <a:fld id="{37D525BB-DA17-4BA0-B3C8-3AC3ABC827E6}" type="datetimeFigureOut">
               <a:rPr lang="en-US" smtClean="0"/>
-              <a:t>11/8/21</a:t>
+              <a:t>11/7/2022</a:t>
             </a:fld>
             <a:endParaRPr lang="en-US" dirty="0"/>
           </a:p>
@@ -3724,7 +3728,7 @@
           <a:p>
             <a:fld id="{B16C4C9A-3960-41CF-A4E9-2A8FB932454B}" type="datetimeFigureOut">
               <a:rPr lang="en-US" smtClean="0"/>
-              <a:t>11/8/21</a:t>
+              <a:t>11/7/2022</a:t>
             </a:fld>
             <a:endParaRPr lang="en-US" dirty="0"/>
           </a:p>
@@ -3817,7 +3821,7 @@
           <p:nvPr/>
         </p:nvPicPr>
         <p:blipFill>
-          <a:blip r:embed="rId13">
+          <a:blip r:embed="rId13" cstate="email">
             <a:extLst>
               <a:ext uri="{28A0092B-C50C-407E-A947-70E740481C1C}">
                 <a14:useLocalDpi xmlns:a14="http://schemas.microsoft.com/office/drawing/2010/main" val="0"/>
@@ -3847,7 +3851,7 @@
           <p:nvPr/>
         </p:nvPicPr>
         <p:blipFill rotWithShape="1">
-          <a:blip r:embed="rId14">
+          <a:blip r:embed="rId14" cstate="email">
             <a:extLst>
               <a:ext uri="{28A0092B-C50C-407E-A947-70E740481C1C}">
                 <a14:useLocalDpi xmlns:a14="http://schemas.microsoft.com/office/drawing/2010/main" val="0"/>
@@ -4075,7 +4079,7 @@
             <a:fld id="{3CBC1C18-307B-4F68-A007-B5B542270E8D}" type="datetimeFigureOut">
               <a:rPr lang="en-US" smtClean="0"/>
               <a:pPr/>
-              <a:t>11/8/21</a:t>
+              <a:t>11/7/2022</a:t>
             </a:fld>
             <a:endParaRPr lang="en-US" dirty="0"/>
           </a:p>
@@ -8138,7 +8142,7 @@
           <p:nvPr/>
         </p:nvPicPr>
         <p:blipFill>
-          <a:blip r:embed="rId2">
+          <a:blip r:embed="rId2" cstate="email">
             <a:extLst>
               <a:ext uri="{28A0092B-C50C-407E-A947-70E740481C1C}">
                 <a14:useLocalDpi xmlns:a14="http://schemas.microsoft.com/office/drawing/2010/main" val="0"/>
@@ -8168,7 +8172,7 @@
           <p:nvPr/>
         </p:nvPicPr>
         <p:blipFill>
-          <a:blip r:embed="rId3">
+          <a:blip r:embed="rId3" cstate="email">
             <a:extLst>
               <a:ext uri="{28A0092B-C50C-407E-A947-70E740481C1C}">
                 <a14:useLocalDpi xmlns:a14="http://schemas.microsoft.com/office/drawing/2010/main" val="0"/>
@@ -8198,7 +8202,7 @@
           <p:nvPr/>
         </p:nvPicPr>
         <p:blipFill>
-          <a:blip r:embed="rId4">
+          <a:blip r:embed="rId4" cstate="email">
             <a:extLst>
               <a:ext uri="{28A0092B-C50C-407E-A947-70E740481C1C}">
                 <a14:useLocalDpi xmlns:a14="http://schemas.microsoft.com/office/drawing/2010/main" val="0"/>
@@ -8339,7 +8343,7 @@
           <p:nvPr/>
         </p:nvPicPr>
         <p:blipFill>
-          <a:blip r:embed="rId3">
+          <a:blip r:embed="rId3" cstate="email">
             <a:extLst>
               <a:ext uri="{28A0092B-C50C-407E-A947-70E740481C1C}">
                 <a14:useLocalDpi xmlns:a14="http://schemas.microsoft.com/office/drawing/2010/main" val="0"/>
@@ -11996,7 +12000,7 @@
           <p:nvPr/>
         </p:nvPicPr>
         <p:blipFill>
-          <a:blip r:embed="rId2">
+          <a:blip r:embed="rId2" cstate="email">
             <a:extLst>
               <a:ext uri="{28A0092B-C50C-407E-A947-70E740481C1C}">
                 <a14:useLocalDpi xmlns:a14="http://schemas.microsoft.com/office/drawing/2010/main" val="0"/>
@@ -15688,7 +15692,7 @@
           <p:nvPr/>
         </p:nvPicPr>
         <p:blipFill>
-          <a:blip r:embed="rId2">
+          <a:blip r:embed="rId2" cstate="email">
             <a:extLst>
               <a:ext uri="{28A0092B-C50C-407E-A947-70E740481C1C}">
                 <a14:useLocalDpi xmlns:a14="http://schemas.microsoft.com/office/drawing/2010/main" val="0"/>
@@ -21037,7 +21041,7 @@
           <p:nvPr/>
         </p:nvPicPr>
         <p:blipFill>
-          <a:blip r:embed="rId2">
+          <a:blip r:embed="rId2" cstate="email">
             <a:extLst>
               <a:ext uri="{28A0092B-C50C-407E-A947-70E740481C1C}">
                 <a14:useLocalDpi xmlns:a14="http://schemas.microsoft.com/office/drawing/2010/main" val="0"/>
@@ -21436,7 +21440,7 @@
           <p:nvPr/>
         </p:nvPicPr>
         <p:blipFill>
-          <a:blip r:embed="rId3">
+          <a:blip r:embed="rId3" cstate="email">
             <a:extLst>
               <a:ext uri="{28A0092B-C50C-407E-A947-70E740481C1C}">
                 <a14:useLocalDpi xmlns:a14="http://schemas.microsoft.com/office/drawing/2010/main" val="0"/>
@@ -22234,7 +22238,9 @@
         </p:nvSpPr>
         <p:spPr/>
         <p:txBody>
-          <a:bodyPr anchor="t" anchorCtr="0"/>
+          <a:bodyPr anchor="t" anchorCtr="0">
+            <a:normAutofit/>
+          </a:bodyPr>
           <a:lstStyle/>
           <a:p>
             <a:r>
@@ -22305,6 +22311,10 @@
             </a:r>
           </a:p>
           <a:p>
+            <a:r>
+              <a:rPr lang="en-US"/>
+              <a:t>https://www.symbolab.com/</a:t>
+            </a:r>
             <a:endParaRPr lang="en-US" dirty="0"/>
           </a:p>
         </p:txBody>
@@ -22313,6 +22323,162 @@
     <p:extLst>
       <p:ext uri="{BB962C8B-B14F-4D97-AF65-F5344CB8AC3E}">
         <p14:creationId xmlns:p14="http://schemas.microsoft.com/office/powerpoint/2010/main" val="964116723"/>
+      </p:ext>
+    </p:extLst>
+  </p:cSld>
+  <p:clrMapOvr>
+    <a:masterClrMapping/>
+  </p:clrMapOvr>
+</p:sld>
+</file>
+
+<file path=ppt/slides/slide29.xml><?xml version="1.0" encoding="utf-8"?>
+<p:sld xmlns:a="http://schemas.openxmlformats.org/drawingml/2006/main" xmlns:r="http://schemas.openxmlformats.org/officeDocument/2006/relationships" xmlns:p="http://schemas.openxmlformats.org/presentationml/2006/main">
+  <p:cSld>
+    <p:spTree>
+      <p:nvGrpSpPr>
+        <p:cNvPr id="1" name=""/>
+        <p:cNvGrpSpPr/>
+        <p:nvPr/>
+      </p:nvGrpSpPr>
+      <p:grpSpPr>
+        <a:xfrm>
+          <a:off x="0" y="0"/>
+          <a:ext cx="0" cy="0"/>
+          <a:chOff x="0" y="0"/>
+          <a:chExt cx="0" cy="0"/>
+        </a:xfrm>
+      </p:grpSpPr>
+      <p:sp>
+        <p:nvSpPr>
+          <p:cNvPr id="2" name="Title 1">
+            <a:extLst>
+              <a:ext uri="{FF2B5EF4-FFF2-40B4-BE49-F238E27FC236}">
+                <a16:creationId xmlns:a16="http://schemas.microsoft.com/office/drawing/2014/main" id="{A818C948-5BEF-57FD-84FA-8A2572E23E74}"/>
+              </a:ext>
+            </a:extLst>
+          </p:cNvPr>
+          <p:cNvSpPr>
+            <a:spLocks noGrp="1"/>
+          </p:cNvSpPr>
+          <p:nvPr>
+            <p:ph type="title"/>
+          </p:nvPr>
+        </p:nvSpPr>
+        <p:spPr/>
+        <p:txBody>
+          <a:bodyPr>
+            <a:normAutofit fontScale="90000"/>
+          </a:bodyPr>
+          <a:lstStyle/>
+          <a:p>
+            <a:r>
+              <a:rPr lang="en-US" dirty="0"/>
+              <a:t>Given </a:t>
+            </a:r>
+            <a:r>
+              <a:rPr lang="en-GB" dirty="0"/>
+              <a:t>Θ=π/2 </a:t>
+            </a:r>
+            <a:r>
+              <a:rPr lang="en-GB" dirty="0" err="1"/>
+              <a:t>Sx</a:t>
+            </a:r>
+            <a:r>
+              <a:rPr lang="en-GB" dirty="0"/>
+              <a:t> = 2 Sy = 3 P=(2 1 1)</a:t>
+            </a:r>
+            <a:br>
+              <a:rPr lang="en-GB" dirty="0"/>
+            </a:br>
+            <a:r>
+              <a:rPr lang="en-GB" dirty="0"/>
+              <a:t>Find R.S.P</a:t>
+            </a:r>
+            <a:br>
+              <a:rPr lang="en-GB" dirty="0"/>
+            </a:br>
+            <a:br>
+              <a:rPr lang="en-GB" dirty="0"/>
+            </a:br>
+            <a:endParaRPr lang="en-GB" dirty="0"/>
+          </a:p>
+        </p:txBody>
+      </p:sp>
+      <p:pic>
+        <p:nvPicPr>
+          <p:cNvPr id="5" name="Content Placeholder 4">
+            <a:extLst>
+              <a:ext uri="{FF2B5EF4-FFF2-40B4-BE49-F238E27FC236}">
+                <a16:creationId xmlns:a16="http://schemas.microsoft.com/office/drawing/2014/main" id="{8B83C993-634E-AA21-7EC3-CEC999987E04}"/>
+              </a:ext>
+            </a:extLst>
+          </p:cNvPr>
+          <p:cNvPicPr>
+            <a:picLocks noGrp="1" noChangeAspect="1"/>
+          </p:cNvPicPr>
+          <p:nvPr>
+            <p:ph idx="1"/>
+          </p:nvPr>
+        </p:nvPicPr>
+        <p:blipFill>
+          <a:blip r:embed="rId2"/>
+          <a:stretch>
+            <a:fillRect/>
+          </a:stretch>
+        </p:blipFill>
+        <p:spPr>
+          <a:xfrm>
+            <a:off x="1715294" y="2887589"/>
+            <a:ext cx="5713412" cy="3813684"/>
+          </a:xfrm>
+        </p:spPr>
+      </p:pic>
+      <p:sp>
+        <p:nvSpPr>
+          <p:cNvPr id="6" name="TextBox 5">
+            <a:extLst>
+              <a:ext uri="{FF2B5EF4-FFF2-40B4-BE49-F238E27FC236}">
+                <a16:creationId xmlns:a16="http://schemas.microsoft.com/office/drawing/2014/main" id="{F9944C14-7A4A-66AE-9B21-E0878A3E854B}"/>
+              </a:ext>
+            </a:extLst>
+          </p:cNvPr>
+          <p:cNvSpPr txBox="1"/>
+          <p:nvPr/>
+        </p:nvSpPr>
+        <p:spPr>
+          <a:xfrm>
+            <a:off x="1715294" y="1960775"/>
+            <a:ext cx="5878011" cy="646331"/>
+          </a:xfrm>
+          <a:prstGeom prst="rect">
+            <a:avLst/>
+          </a:prstGeom>
+          <a:noFill/>
+        </p:spPr>
+        <p:txBody>
+          <a:bodyPr wrap="square" rtlCol="0">
+            <a:spAutoFit/>
+          </a:bodyPr>
+          <a:lstStyle/>
+          <a:p>
+            <a:r>
+              <a:rPr lang="en-GB" dirty="0"/>
+              <a:t>Cos(π/2) = 0</a:t>
+            </a:r>
+          </a:p>
+          <a:p>
+            <a:r>
+              <a:rPr lang="en-GB" dirty="0"/>
+              <a:t>Sin(π/2 ) = 1</a:t>
+            </a:r>
+          </a:p>
+        </p:txBody>
+      </p:sp>
+    </p:spTree>
+    <p:extLst>
+      <p:ext uri="{BB962C8B-B14F-4D97-AF65-F5344CB8AC3E}">
+        <p14:creationId xmlns:p14="http://schemas.microsoft.com/office/powerpoint/2010/main" val="860067909"/>
       </p:ext>
     </p:extLst>
   </p:cSld>
@@ -22423,6 +22589,418 @@
     <p:extLst>
       <p:ext uri="{BB962C8B-B14F-4D97-AF65-F5344CB8AC3E}">
         <p14:creationId xmlns:p14="http://schemas.microsoft.com/office/powerpoint/2010/main" val="1825526547"/>
+      </p:ext>
+    </p:extLst>
+  </p:cSld>
+  <p:clrMapOvr>
+    <a:masterClrMapping/>
+  </p:clrMapOvr>
+</p:sld>
+</file>
+
+<file path=ppt/slides/slide30.xml><?xml version="1.0" encoding="utf-8"?>
+<p:sld xmlns:a="http://schemas.openxmlformats.org/drawingml/2006/main" xmlns:r="http://schemas.openxmlformats.org/officeDocument/2006/relationships" xmlns:p="http://schemas.openxmlformats.org/presentationml/2006/main">
+  <p:cSld>
+    <p:spTree>
+      <p:nvGrpSpPr>
+        <p:cNvPr id="1" name=""/>
+        <p:cNvGrpSpPr/>
+        <p:nvPr/>
+      </p:nvGrpSpPr>
+      <p:grpSpPr>
+        <a:xfrm>
+          <a:off x="0" y="0"/>
+          <a:ext cx="0" cy="0"/>
+          <a:chOff x="0" y="0"/>
+          <a:chExt cx="0" cy="0"/>
+        </a:xfrm>
+      </p:grpSpPr>
+      <p:sp>
+        <p:nvSpPr>
+          <p:cNvPr id="2" name="Title 1">
+            <a:extLst>
+              <a:ext uri="{FF2B5EF4-FFF2-40B4-BE49-F238E27FC236}">
+                <a16:creationId xmlns:a16="http://schemas.microsoft.com/office/drawing/2014/main" id="{D0B344BF-5D2E-A546-6334-5388E4417998}"/>
+              </a:ext>
+            </a:extLst>
+          </p:cNvPr>
+          <p:cNvSpPr>
+            <a:spLocks noGrp="1"/>
+          </p:cNvSpPr>
+          <p:nvPr>
+            <p:ph type="title"/>
+          </p:nvPr>
+        </p:nvSpPr>
+        <p:spPr/>
+        <p:txBody>
+          <a:bodyPr>
+            <a:normAutofit fontScale="90000"/>
+          </a:bodyPr>
+          <a:lstStyle/>
+          <a:p>
+            <a:r>
+              <a:rPr lang="en-US" dirty="0"/>
+              <a:t>Given </a:t>
+            </a:r>
+            <a:r>
+              <a:rPr lang="en-GB" dirty="0"/>
+              <a:t>Θ=π/2 </a:t>
+            </a:r>
+            <a:r>
+              <a:rPr lang="en-GB" dirty="0" err="1"/>
+              <a:t>Sx</a:t>
+            </a:r>
+            <a:r>
+              <a:rPr lang="en-GB" dirty="0"/>
+              <a:t> = 2 Sy = 3 P=(2 1 1)</a:t>
+            </a:r>
+            <a:br>
+              <a:rPr lang="en-SG" dirty="0"/>
+            </a:br>
+            <a:r>
+              <a:rPr lang="en-GB" dirty="0"/>
+              <a:t>Find S.R.P</a:t>
+            </a:r>
+          </a:p>
+        </p:txBody>
+      </p:sp>
+      <p:sp>
+        <p:nvSpPr>
+          <p:cNvPr id="6" name="Content Placeholder 5">
+            <a:extLst>
+              <a:ext uri="{FF2B5EF4-FFF2-40B4-BE49-F238E27FC236}">
+                <a16:creationId xmlns:a16="http://schemas.microsoft.com/office/drawing/2014/main" id="{3E4E16EA-6AF8-103E-6AF9-4DA7AAF54CD6}"/>
+              </a:ext>
+            </a:extLst>
+          </p:cNvPr>
+          <p:cNvSpPr txBox="1">
+            <a:spLocks noGrp="1"/>
+          </p:cNvSpPr>
+          <p:nvPr>
+            <p:ph idx="1"/>
+          </p:nvPr>
+        </p:nvSpPr>
+        <p:spPr>
+          <a:xfrm>
+            <a:off x="2125916" y="1557435"/>
+            <a:ext cx="5713412" cy="893321"/>
+          </a:xfrm>
+          <a:prstGeom prst="rect">
+            <a:avLst/>
+          </a:prstGeom>
+          <a:noFill/>
+        </p:spPr>
+        <p:txBody>
+          <a:bodyPr wrap="square" rtlCol="0">
+            <a:spAutoFit/>
+          </a:bodyPr>
+          <a:lstStyle/>
+          <a:p>
+            <a:pPr marL="0" indent="0">
+              <a:buNone/>
+            </a:pPr>
+            <a:r>
+              <a:rPr lang="en-GB" dirty="0"/>
+              <a:t>Cos(π/2) = 0</a:t>
+            </a:r>
+          </a:p>
+          <a:p>
+            <a:pPr marL="0" indent="0">
+              <a:buNone/>
+            </a:pPr>
+            <a:r>
+              <a:rPr lang="en-GB" dirty="0"/>
+              <a:t>Sin(π/2 ) = 1 </a:t>
+            </a:r>
+          </a:p>
+        </p:txBody>
+      </p:sp>
+      <p:pic>
+        <p:nvPicPr>
+          <p:cNvPr id="8" name="Picture 7">
+            <a:extLst>
+              <a:ext uri="{FF2B5EF4-FFF2-40B4-BE49-F238E27FC236}">
+                <a16:creationId xmlns:a16="http://schemas.microsoft.com/office/drawing/2014/main" id="{33D9F1D9-B9A8-F1D7-A0A0-0D56F354BC11}"/>
+              </a:ext>
+            </a:extLst>
+          </p:cNvPr>
+          <p:cNvPicPr>
+            <a:picLocks noChangeAspect="1"/>
+          </p:cNvPicPr>
+          <p:nvPr/>
+        </p:nvPicPr>
+        <p:blipFill>
+          <a:blip r:embed="rId2"/>
+          <a:stretch>
+            <a:fillRect/>
+          </a:stretch>
+        </p:blipFill>
+        <p:spPr>
+          <a:xfrm>
+            <a:off x="1590386" y="2450756"/>
+            <a:ext cx="6248942" cy="4237087"/>
+          </a:xfrm>
+          <a:prstGeom prst="rect">
+            <a:avLst/>
+          </a:prstGeom>
+        </p:spPr>
+      </p:pic>
+    </p:spTree>
+    <p:extLst>
+      <p:ext uri="{BB962C8B-B14F-4D97-AF65-F5344CB8AC3E}">
+        <p14:creationId xmlns:p14="http://schemas.microsoft.com/office/powerpoint/2010/main" val="2523201769"/>
+      </p:ext>
+    </p:extLst>
+  </p:cSld>
+  <p:clrMapOvr>
+    <a:masterClrMapping/>
+  </p:clrMapOvr>
+</p:sld>
+</file>
+
+<file path=ppt/slides/slide31.xml><?xml version="1.0" encoding="utf-8"?>
+<p:sld xmlns:a="http://schemas.openxmlformats.org/drawingml/2006/main" xmlns:r="http://schemas.openxmlformats.org/officeDocument/2006/relationships" xmlns:p="http://schemas.openxmlformats.org/presentationml/2006/main">
+  <p:cSld>
+    <p:spTree>
+      <p:nvGrpSpPr>
+        <p:cNvPr id="1" name=""/>
+        <p:cNvGrpSpPr/>
+        <p:nvPr/>
+      </p:nvGrpSpPr>
+      <p:grpSpPr>
+        <a:xfrm>
+          <a:off x="0" y="0"/>
+          <a:ext cx="0" cy="0"/>
+          <a:chOff x="0" y="0"/>
+          <a:chExt cx="0" cy="0"/>
+        </a:xfrm>
+      </p:grpSpPr>
+      <p:sp>
+        <p:nvSpPr>
+          <p:cNvPr id="2" name="Title 1">
+            <a:extLst>
+              <a:ext uri="{FF2B5EF4-FFF2-40B4-BE49-F238E27FC236}">
+                <a16:creationId xmlns:a16="http://schemas.microsoft.com/office/drawing/2014/main" id="{527CA281-E8D8-5181-9309-ACA8C79EF111}"/>
+              </a:ext>
+            </a:extLst>
+          </p:cNvPr>
+          <p:cNvSpPr>
+            <a:spLocks noGrp="1"/>
+          </p:cNvSpPr>
+          <p:nvPr>
+            <p:ph type="title"/>
+          </p:nvPr>
+        </p:nvSpPr>
+        <p:spPr/>
+        <p:txBody>
+          <a:bodyPr>
+            <a:normAutofit fontScale="90000"/>
+          </a:bodyPr>
+          <a:lstStyle/>
+          <a:p>
+            <a:r>
+              <a:rPr lang="en-GB" dirty="0"/>
+              <a:t>Θ=π/3 Tx = 3 Ty = 1 P=(1 3 1)</a:t>
+            </a:r>
+            <a:r>
+              <a:rPr lang="en-SG" dirty="0"/>
+              <a:t> </a:t>
+            </a:r>
+            <a:br>
+              <a:rPr lang="en-SG" dirty="0"/>
+            </a:br>
+            <a:r>
+              <a:rPr lang="en-GB" dirty="0"/>
+              <a:t>Find R.T.P</a:t>
+            </a:r>
+            <a:br>
+              <a:rPr lang="en-GB" dirty="0"/>
+            </a:br>
+            <a:endParaRPr lang="en-GB" dirty="0"/>
+          </a:p>
+        </p:txBody>
+      </p:sp>
+      <p:sp>
+        <p:nvSpPr>
+          <p:cNvPr id="3" name="Content Placeholder 2">
+            <a:extLst>
+              <a:ext uri="{FF2B5EF4-FFF2-40B4-BE49-F238E27FC236}">
+                <a16:creationId xmlns:a16="http://schemas.microsoft.com/office/drawing/2014/main" id="{011310A1-EF60-68A9-14BA-4574C2EDD30D}"/>
+              </a:ext>
+            </a:extLst>
+          </p:cNvPr>
+          <p:cNvSpPr>
+            <a:spLocks noGrp="1"/>
+          </p:cNvSpPr>
+          <p:nvPr>
+            <p:ph idx="1"/>
+          </p:nvPr>
+        </p:nvSpPr>
+        <p:spPr>
+          <a:xfrm>
+            <a:off x="2043776" y="1621871"/>
+            <a:ext cx="5713092" cy="683895"/>
+          </a:xfrm>
+        </p:spPr>
+        <p:txBody>
+          <a:bodyPr>
+            <a:normAutofit fontScale="77500" lnSpcReduction="20000"/>
+          </a:bodyPr>
+          <a:lstStyle/>
+          <a:p>
+            <a:pPr marL="0" indent="0">
+              <a:buNone/>
+            </a:pPr>
+            <a:r>
+              <a:rPr lang="en-SG" dirty="0"/>
+              <a:t>Sin(</a:t>
+            </a:r>
+            <a:r>
+              <a:rPr lang="en-GB" dirty="0"/>
+              <a:t>π/3) = 0.866</a:t>
+            </a:r>
+          </a:p>
+          <a:p>
+            <a:pPr marL="0" indent="0">
+              <a:buNone/>
+            </a:pPr>
+            <a:r>
+              <a:rPr lang="en-GB" dirty="0"/>
+              <a:t>Cos(π/3)=0.5</a:t>
+            </a:r>
+          </a:p>
+        </p:txBody>
+      </p:sp>
+      <p:pic>
+        <p:nvPicPr>
+          <p:cNvPr id="5" name="Picture 4">
+            <a:extLst>
+              <a:ext uri="{FF2B5EF4-FFF2-40B4-BE49-F238E27FC236}">
+                <a16:creationId xmlns:a16="http://schemas.microsoft.com/office/drawing/2014/main" id="{9ADD6AEA-C2E3-77AF-2EC5-974890B1262D}"/>
+              </a:ext>
+            </a:extLst>
+          </p:cNvPr>
+          <p:cNvPicPr>
+            <a:picLocks noChangeAspect="1"/>
+          </p:cNvPicPr>
+          <p:nvPr/>
+        </p:nvPicPr>
+        <p:blipFill>
+          <a:blip r:embed="rId2"/>
+          <a:stretch>
+            <a:fillRect/>
+          </a:stretch>
+        </p:blipFill>
+        <p:spPr>
+          <a:xfrm>
+            <a:off x="2072056" y="2522710"/>
+            <a:ext cx="4332512" cy="4059049"/>
+          </a:xfrm>
+          <a:prstGeom prst="rect">
+            <a:avLst/>
+          </a:prstGeom>
+        </p:spPr>
+      </p:pic>
+    </p:spTree>
+    <p:extLst>
+      <p:ext uri="{BB962C8B-B14F-4D97-AF65-F5344CB8AC3E}">
+        <p14:creationId xmlns:p14="http://schemas.microsoft.com/office/powerpoint/2010/main" val="461392756"/>
+      </p:ext>
+    </p:extLst>
+  </p:cSld>
+  <p:clrMapOvr>
+    <a:masterClrMapping/>
+  </p:clrMapOvr>
+</p:sld>
+</file>
+
+<file path=ppt/slides/slide32.xml><?xml version="1.0" encoding="utf-8"?>
+<p:sld xmlns:a="http://schemas.openxmlformats.org/drawingml/2006/main" xmlns:r="http://schemas.openxmlformats.org/officeDocument/2006/relationships" xmlns:p="http://schemas.openxmlformats.org/presentationml/2006/main">
+  <p:cSld>
+    <p:spTree>
+      <p:nvGrpSpPr>
+        <p:cNvPr id="1" name=""/>
+        <p:cNvGrpSpPr/>
+        <p:nvPr/>
+      </p:nvGrpSpPr>
+      <p:grpSpPr>
+        <a:xfrm>
+          <a:off x="0" y="0"/>
+          <a:ext cx="0" cy="0"/>
+          <a:chOff x="0" y="0"/>
+          <a:chExt cx="0" cy="0"/>
+        </a:xfrm>
+      </p:grpSpPr>
+      <p:sp>
+        <p:nvSpPr>
+          <p:cNvPr id="2" name="Title 1">
+            <a:extLst>
+              <a:ext uri="{FF2B5EF4-FFF2-40B4-BE49-F238E27FC236}">
+                <a16:creationId xmlns:a16="http://schemas.microsoft.com/office/drawing/2014/main" id="{96E02181-2B7B-04DC-CA52-166F2B38C9D4}"/>
+              </a:ext>
+            </a:extLst>
+          </p:cNvPr>
+          <p:cNvSpPr>
+            <a:spLocks noGrp="1"/>
+          </p:cNvSpPr>
+          <p:nvPr>
+            <p:ph type="title"/>
+          </p:nvPr>
+        </p:nvSpPr>
+        <p:spPr/>
+        <p:txBody>
+          <a:bodyPr>
+            <a:normAutofit/>
+          </a:bodyPr>
+          <a:lstStyle/>
+          <a:p>
+            <a:r>
+              <a:rPr lang="en-GB" dirty="0"/>
+              <a:t>Θ=π/3 Tx = 3 Ty = 1 P=(1 3 1)</a:t>
+            </a:r>
+            <a:br>
+              <a:rPr lang="en-GB" dirty="0"/>
+            </a:br>
+            <a:r>
+              <a:rPr lang="en-GB" dirty="0"/>
+              <a:t>Find T.R.P</a:t>
+            </a:r>
+          </a:p>
+        </p:txBody>
+      </p:sp>
+      <p:pic>
+        <p:nvPicPr>
+          <p:cNvPr id="5" name="Content Placeholder 4">
+            <a:extLst>
+              <a:ext uri="{FF2B5EF4-FFF2-40B4-BE49-F238E27FC236}">
+                <a16:creationId xmlns:a16="http://schemas.microsoft.com/office/drawing/2014/main" id="{941F92A7-309F-DFD2-C84F-0046178CD4C3}"/>
+              </a:ext>
+            </a:extLst>
+          </p:cNvPr>
+          <p:cNvPicPr>
+            <a:picLocks noGrp="1" noChangeAspect="1"/>
+          </p:cNvPicPr>
+          <p:nvPr>
+            <p:ph idx="1"/>
+          </p:nvPr>
+        </p:nvPicPr>
+        <p:blipFill>
+          <a:blip r:embed="rId2"/>
+          <a:stretch>
+            <a:fillRect/>
+          </a:stretch>
+        </p:blipFill>
+        <p:spPr>
+          <a:xfrm>
+            <a:off x="3007060" y="2049463"/>
+            <a:ext cx="3950618" cy="4000500"/>
+          </a:xfrm>
+        </p:spPr>
+      </p:pic>
+    </p:spTree>
+    <p:extLst>
+      <p:ext uri="{BB962C8B-B14F-4D97-AF65-F5344CB8AC3E}">
+        <p14:creationId xmlns:p14="http://schemas.microsoft.com/office/powerpoint/2010/main" val="1198035655"/>
       </p:ext>
     </p:extLst>
   </p:cSld>
@@ -29693,7 +30271,7 @@
           <p:nvPr/>
         </p:nvPicPr>
         <p:blipFill>
-          <a:blip r:embed="rId2">
+          <a:blip r:embed="rId2" cstate="email">
             <a:extLst>
               <a:ext uri="{28A0092B-C50C-407E-A947-70E740481C1C}">
                 <a14:useLocalDpi xmlns:a14="http://schemas.microsoft.com/office/drawing/2010/main" val="0"/>
@@ -29941,7 +30519,7 @@
           <p:nvPr/>
         </p:nvPicPr>
         <p:blipFill>
-          <a:blip r:embed="rId2">
+          <a:blip r:embed="rId2" cstate="email">
             <a:extLst>
               <a:ext uri="{28A0092B-C50C-407E-A947-70E740481C1C}">
                 <a14:useLocalDpi xmlns:a14="http://schemas.microsoft.com/office/drawing/2010/main" val="0"/>
@@ -29971,7 +30549,7 @@
           <p:nvPr/>
         </p:nvPicPr>
         <p:blipFill>
-          <a:blip r:embed="rId3">
+          <a:blip r:embed="rId3" cstate="email">
             <a:extLst>
               <a:ext uri="{28A0092B-C50C-407E-A947-70E740481C1C}">
                 <a14:useLocalDpi xmlns:a14="http://schemas.microsoft.com/office/drawing/2010/main" val="0"/>
@@ -30001,7 +30579,7 @@
           <p:nvPr/>
         </p:nvPicPr>
         <p:blipFill>
-          <a:blip r:embed="rId4">
+          <a:blip r:embed="rId4" cstate="email">
             <a:extLst>
               <a:ext uri="{28A0092B-C50C-407E-A947-70E740481C1C}">
                 <a14:useLocalDpi xmlns:a14="http://schemas.microsoft.com/office/drawing/2010/main" val="0"/>

</xml_diff>